<commit_message>
presentazione quasi completa (rischi e animazioni)
</commit_message>
<xml_diff>
--- a/Power Enjoy System.pptx
+++ b/Power Enjoy System.pptx
@@ -7715,13 +7715,8 @@
           <a:p>
             <a:r>
               <a:rPr lang="it-IT" dirty="0"/>
-              <a:t>PP</a:t>
-            </a:r>
-            <a:r>
-              <a:rPr lang="it-IT"/>
-              <a:t>: Risks</a:t>
-            </a:r>
-            <a:endParaRPr lang="it-IT"/>
+              <a:t>PP: Risks</a:t>
+            </a:r>
           </a:p>
         </p:txBody>
       </p:sp>

</xml_diff>